<commit_message>
* Behebung eines Fehlers, durch den die Bilder der Felder nach dem Rechtsklick nicht richtig angezeigt wurden. * Hinzufügen einer Methode, durch die das gesamte Spielfeld bei Spielende sichtbar gemacht wird. * Hinzufügen eines Bilds für freie Felder ohne Nachbar-Bomben
</commit_message>
<xml_diff>
--- a/Minesweeper/bilder/Bilder.pptx
+++ b/Minesweeper/bilder/Bilder.pptx
@@ -259,7 +259,7 @@
           <a:p>
             <a:fld id="{0A359ABE-A16E-4A4D-999C-5D3380E0EA67}" type="datetimeFigureOut">
               <a:rPr lang="de-DE" smtClean="0"/>
-              <a:t>23.09.2023</a:t>
+              <a:t>25.09.2023</a:t>
             </a:fld>
             <a:endParaRPr lang="de-DE"/>
           </a:p>
@@ -457,7 +457,7 @@
           <a:p>
             <a:fld id="{0A359ABE-A16E-4A4D-999C-5D3380E0EA67}" type="datetimeFigureOut">
               <a:rPr lang="de-DE" smtClean="0"/>
-              <a:t>23.09.2023</a:t>
+              <a:t>25.09.2023</a:t>
             </a:fld>
             <a:endParaRPr lang="de-DE"/>
           </a:p>
@@ -665,7 +665,7 @@
           <a:p>
             <a:fld id="{0A359ABE-A16E-4A4D-999C-5D3380E0EA67}" type="datetimeFigureOut">
               <a:rPr lang="de-DE" smtClean="0"/>
-              <a:t>23.09.2023</a:t>
+              <a:t>25.09.2023</a:t>
             </a:fld>
             <a:endParaRPr lang="de-DE"/>
           </a:p>
@@ -863,7 +863,7 @@
           <a:p>
             <a:fld id="{0A359ABE-A16E-4A4D-999C-5D3380E0EA67}" type="datetimeFigureOut">
               <a:rPr lang="de-DE" smtClean="0"/>
-              <a:t>23.09.2023</a:t>
+              <a:t>25.09.2023</a:t>
             </a:fld>
             <a:endParaRPr lang="de-DE"/>
           </a:p>
@@ -1138,7 +1138,7 @@
           <a:p>
             <a:fld id="{0A359ABE-A16E-4A4D-999C-5D3380E0EA67}" type="datetimeFigureOut">
               <a:rPr lang="de-DE" smtClean="0"/>
-              <a:t>23.09.2023</a:t>
+              <a:t>25.09.2023</a:t>
             </a:fld>
             <a:endParaRPr lang="de-DE"/>
           </a:p>
@@ -1403,7 +1403,7 @@
           <a:p>
             <a:fld id="{0A359ABE-A16E-4A4D-999C-5D3380E0EA67}" type="datetimeFigureOut">
               <a:rPr lang="de-DE" smtClean="0"/>
-              <a:t>23.09.2023</a:t>
+              <a:t>25.09.2023</a:t>
             </a:fld>
             <a:endParaRPr lang="de-DE"/>
           </a:p>
@@ -1815,7 +1815,7 @@
           <a:p>
             <a:fld id="{0A359ABE-A16E-4A4D-999C-5D3380E0EA67}" type="datetimeFigureOut">
               <a:rPr lang="de-DE" smtClean="0"/>
-              <a:t>23.09.2023</a:t>
+              <a:t>25.09.2023</a:t>
             </a:fld>
             <a:endParaRPr lang="de-DE"/>
           </a:p>
@@ -1956,7 +1956,7 @@
           <a:p>
             <a:fld id="{0A359ABE-A16E-4A4D-999C-5D3380E0EA67}" type="datetimeFigureOut">
               <a:rPr lang="de-DE" smtClean="0"/>
-              <a:t>23.09.2023</a:t>
+              <a:t>25.09.2023</a:t>
             </a:fld>
             <a:endParaRPr lang="de-DE"/>
           </a:p>
@@ -2069,7 +2069,7 @@
           <a:p>
             <a:fld id="{0A359ABE-A16E-4A4D-999C-5D3380E0EA67}" type="datetimeFigureOut">
               <a:rPr lang="de-DE" smtClean="0"/>
-              <a:t>23.09.2023</a:t>
+              <a:t>25.09.2023</a:t>
             </a:fld>
             <a:endParaRPr lang="de-DE"/>
           </a:p>
@@ -2380,7 +2380,7 @@
           <a:p>
             <a:fld id="{0A359ABE-A16E-4A4D-999C-5D3380E0EA67}" type="datetimeFigureOut">
               <a:rPr lang="de-DE" smtClean="0"/>
-              <a:t>23.09.2023</a:t>
+              <a:t>25.09.2023</a:t>
             </a:fld>
             <a:endParaRPr lang="de-DE"/>
           </a:p>
@@ -2668,7 +2668,7 @@
           <a:p>
             <a:fld id="{0A359ABE-A16E-4A4D-999C-5D3380E0EA67}" type="datetimeFigureOut">
               <a:rPr lang="de-DE" smtClean="0"/>
-              <a:t>23.09.2023</a:t>
+              <a:t>25.09.2023</a:t>
             </a:fld>
             <a:endParaRPr lang="de-DE"/>
           </a:p>
@@ -2909,7 +2909,7 @@
           <a:p>
             <a:fld id="{0A359ABE-A16E-4A4D-999C-5D3380E0EA67}" type="datetimeFigureOut">
               <a:rPr lang="de-DE" smtClean="0"/>
-              <a:t>23.09.2023</a:t>
+              <a:t>25.09.2023</a:t>
             </a:fld>
             <a:endParaRPr lang="de-DE"/>
           </a:p>
@@ -3990,6 +3990,45 @@
           </a:p>
         </p:txBody>
       </p:sp>
+      <p:pic>
+        <p:nvPicPr>
+          <p:cNvPr id="4" name="Grafik 3" descr="Schließen mit einfarbiger Füllung">
+            <a:extLst>
+              <a:ext uri="{FF2B5EF4-FFF2-40B4-BE49-F238E27FC236}">
+                <a16:creationId xmlns:a16="http://schemas.microsoft.com/office/drawing/2014/main" id="{DC4DE30E-37A2-C710-66B7-F5FEBE5A50D5}"/>
+              </a:ext>
+            </a:extLst>
+          </p:cNvPr>
+          <p:cNvPicPr>
+            <a:picLocks noChangeAspect="1"/>
+          </p:cNvPicPr>
+          <p:nvPr/>
+        </p:nvPicPr>
+        <p:blipFill>
+          <a:blip r:embed="rId33">
+            <a:extLst>
+              <a:ext uri="{28A0092B-C50C-407E-A947-70E740481C1C}">
+                <a14:useLocalDpi xmlns:a14="http://schemas.microsoft.com/office/drawing/2010/main" val="0"/>
+              </a:ext>
+              <a:ext uri="{96DAC541-7B7A-43D3-8B79-37D633B846F1}">
+                <asvg:svgBlip xmlns:asvg="http://schemas.microsoft.com/office/drawing/2016/SVG/main" r:embed="rId34"/>
+              </a:ext>
+            </a:extLst>
+          </a:blip>
+          <a:stretch>
+            <a:fillRect/>
+          </a:stretch>
+        </p:blipFill>
+        <p:spPr>
+          <a:xfrm>
+            <a:off x="10409640" y="1056040"/>
+            <a:ext cx="360000" cy="360000"/>
+          </a:xfrm>
+          <a:prstGeom prst="rect">
+            <a:avLst/>
+          </a:prstGeom>
+        </p:spPr>
+      </p:pic>
     </p:spTree>
     <p:extLst>
       <p:ext uri="{BB962C8B-B14F-4D97-AF65-F5344CB8AC3E}">

</xml_diff>